<commit_message>
idk what i did here
</commit_message>
<xml_diff>
--- a/Presentation1.pptx
+++ b/Presentation1.pptx
@@ -1658,7 +1658,7 @@
   <cdr:relSizeAnchor xmlns:cdr="http://schemas.openxmlformats.org/drawingml/2006/chartDrawing">
     <cdr:from>
       <cdr:x>0</cdr:x>
-      <cdr:y>0</cdr:y>
+      <cdr:y>0.0637</cdr:y>
     </cdr:from>
     <cdr:to>
       <cdr:x>1</cdr:x>
@@ -1666,7 +1666,7 @@
     </cdr:to>
     <cdr:pic>
       <cdr:nvPicPr>
-        <cdr:cNvPr id="3" name="Picture 2"/>
+        <cdr:cNvPr id="2" name="Picture 1"/>
         <cdr:cNvPicPr>
           <a:picLocks xmlns:a="http://schemas.openxmlformats.org/drawingml/2006/main" noChangeAspect="1"/>
         </cdr:cNvPicPr>
@@ -1685,18 +1685,12 @@
       </cdr:blipFill>
       <cdr:spPr>
         <a:xfrm xmlns:a="http://schemas.openxmlformats.org/drawingml/2006/main">
-          <a:off x="-22479001" y="0"/>
-          <a:ext cx="10210800" cy="8112479"/>
+          <a:off x="0" y="472804"/>
+          <a:ext cx="10972801" cy="6949441"/>
         </a:xfrm>
         <a:prstGeom xmlns:a="http://schemas.openxmlformats.org/drawingml/2006/main" prst="rect">
           <a:avLst/>
         </a:prstGeom>
-        <a:ln xmlns:a="http://schemas.openxmlformats.org/drawingml/2006/main" w="76200">
-          <a:solidFill>
-            <a:srgbClr val="FAC822"/>
-          </a:solidFill>
-          <a:prstDash val="solid"/>
-        </a:ln>
       </cdr:spPr>
     </cdr:pic>
   </cdr:relSizeAnchor>
@@ -2536,7 +2530,7 @@
           <p:cNvPr id="9" name="Straight Connector 29">
             <a:extLst>
               <a:ext uri="{FF2B5EF4-FFF2-40B4-BE49-F238E27FC236}">
-                <a16:creationId xmlns="" xmlns:a16="http://schemas.microsoft.com/office/drawing/2014/main" id="{7A538AB7-3217-C248-8892-F3626FEEC001}"/>
+                <a16:creationId xmlns:a16="http://schemas.microsoft.com/office/drawing/2014/main" xmlns="" id="{7A538AB7-3217-C248-8892-F3626FEEC001}"/>
               </a:ext>
             </a:extLst>
           </p:cNvPr>
@@ -2571,7 +2565,7 @@
           <p:cNvPr id="7" name="Straight Connector 6">
             <a:extLst>
               <a:ext uri="{FF2B5EF4-FFF2-40B4-BE49-F238E27FC236}">
-                <a16:creationId xmlns="" xmlns:a16="http://schemas.microsoft.com/office/drawing/2014/main" id="{96588D3F-C4C4-0944-961A-E34F2D2C0FA2}"/>
+                <a16:creationId xmlns:a16="http://schemas.microsoft.com/office/drawing/2014/main" xmlns="" id="{96588D3F-C4C4-0944-961A-E34F2D2C0FA2}"/>
               </a:ext>
             </a:extLst>
           </p:cNvPr>
@@ -2606,7 +2600,7 @@
           <p:cNvPr id="8" name="Rectangle 7">
             <a:extLst>
               <a:ext uri="{FF2B5EF4-FFF2-40B4-BE49-F238E27FC236}">
-                <a16:creationId xmlns="" xmlns:a16="http://schemas.microsoft.com/office/drawing/2014/main" id="{8A8BD5AA-FD73-6045-84CC-9C2BA3DBA517}"/>
+                <a16:creationId xmlns:a16="http://schemas.microsoft.com/office/drawing/2014/main" xmlns="" id="{8A8BD5AA-FD73-6045-84CC-9C2BA3DBA517}"/>
               </a:ext>
             </a:extLst>
           </p:cNvPr>
@@ -2675,7 +2669,7 @@
           <p:cNvPr id="2" name="Picture 1">
             <a:extLst>
               <a:ext uri="{FF2B5EF4-FFF2-40B4-BE49-F238E27FC236}">
-                <a16:creationId xmlns="" xmlns:a16="http://schemas.microsoft.com/office/drawing/2014/main" id="{9DA1CF5D-6C7A-3A62-9C69-49E21C034C3E}"/>
+                <a16:creationId xmlns:a16="http://schemas.microsoft.com/office/drawing/2014/main" xmlns="" id="{9DA1CF5D-6C7A-3A62-9C69-49E21C034C3E}"/>
               </a:ext>
             </a:extLst>
           </p:cNvPr>
@@ -2742,7 +2736,7 @@
           <p:cNvPr id="9" name="Straight Connector 29">
             <a:extLst>
               <a:ext uri="{FF2B5EF4-FFF2-40B4-BE49-F238E27FC236}">
-                <a16:creationId xmlns="" xmlns:a16="http://schemas.microsoft.com/office/drawing/2014/main" id="{7A538AB7-3217-C248-8892-F3626FEEC001}"/>
+                <a16:creationId xmlns:a16="http://schemas.microsoft.com/office/drawing/2014/main" xmlns="" id="{7A538AB7-3217-C248-8892-F3626FEEC001}"/>
               </a:ext>
             </a:extLst>
           </p:cNvPr>
@@ -2869,7 +2863,7 @@
           <p:cNvPr id="18" name="Rectangle 17">
             <a:extLst>
               <a:ext uri="{FF2B5EF4-FFF2-40B4-BE49-F238E27FC236}">
-                <a16:creationId xmlns="" xmlns:a16="http://schemas.microsoft.com/office/drawing/2014/main" id="{397EC41C-9AE5-674A-87F3-4190FB0C7690}"/>
+                <a16:creationId xmlns:a16="http://schemas.microsoft.com/office/drawing/2014/main" xmlns="" id="{397EC41C-9AE5-674A-87F3-4190FB0C7690}"/>
               </a:ext>
             </a:extLst>
           </p:cNvPr>
@@ -2938,7 +2932,7 @@
           <p:cNvPr id="5" name="Picture Placeholder 21">
             <a:extLst>
               <a:ext uri="{FF2B5EF4-FFF2-40B4-BE49-F238E27FC236}">
-                <a16:creationId xmlns="" xmlns:a16="http://schemas.microsoft.com/office/drawing/2014/main" id="{A3380D27-8E05-8602-1A4D-66E2EB7801EC}"/>
+                <a16:creationId xmlns:a16="http://schemas.microsoft.com/office/drawing/2014/main" xmlns="" id="{A3380D27-8E05-8602-1A4D-66E2EB7801EC}"/>
               </a:ext>
             </a:extLst>
           </p:cNvPr>
@@ -2976,7 +2970,7 @@
           <p:cNvPr id="2" name="Picture 1">
             <a:extLst>
               <a:ext uri="{FF2B5EF4-FFF2-40B4-BE49-F238E27FC236}">
-                <a16:creationId xmlns="" xmlns:a16="http://schemas.microsoft.com/office/drawing/2014/main" id="{DBF72F51-FBA5-81BA-5804-79597F6AE127}"/>
+                <a16:creationId xmlns:a16="http://schemas.microsoft.com/office/drawing/2014/main" xmlns="" id="{DBF72F51-FBA5-81BA-5804-79597F6AE127}"/>
               </a:ext>
             </a:extLst>
           </p:cNvPr>
@@ -3536,7 +3530,7 @@
           <p:cNvPr id="2" name="TextBox 1">
             <a:extLst>
               <a:ext uri="{FF2B5EF4-FFF2-40B4-BE49-F238E27FC236}">
-                <a16:creationId xmlns="" xmlns:a16="http://schemas.microsoft.com/office/drawing/2014/main" id="{3C1BB7D9-AFF0-7293-119F-7512A9F6958B}"/>
+                <a16:creationId xmlns:a16="http://schemas.microsoft.com/office/drawing/2014/main" xmlns="" id="{3C1BB7D9-AFF0-7293-119F-7512A9F6958B}"/>
               </a:ext>
             </a:extLst>
           </p:cNvPr>
@@ -3632,7 +3626,7 @@
           <p:cNvPr id="3" name="TextBox 46">
             <a:extLst>
               <a:ext uri="{FF2B5EF4-FFF2-40B4-BE49-F238E27FC236}">
-                <a16:creationId xmlns="" xmlns:a16="http://schemas.microsoft.com/office/drawing/2014/main" id="{142020AD-317E-A8EC-0393-0CF02D92AA87}"/>
+                <a16:creationId xmlns:a16="http://schemas.microsoft.com/office/drawing/2014/main" xmlns="" id="{142020AD-317E-A8EC-0393-0CF02D92AA87}"/>
               </a:ext>
             </a:extLst>
           </p:cNvPr>
@@ -3897,7 +3891,7 @@
           <p:cNvPr id="5" name="Chart 4">
             <a:extLst>
               <a:ext uri="{FF2B5EF4-FFF2-40B4-BE49-F238E27FC236}">
-                <a16:creationId xmlns="" xmlns:a16="http://schemas.microsoft.com/office/drawing/2014/main" id="{F5B164C4-209D-B9B9-C5FE-0FCA33E46184}"/>
+                <a16:creationId xmlns:a16="http://schemas.microsoft.com/office/drawing/2014/main" xmlns="" id="{F5B164C4-209D-B9B9-C5FE-0FCA33E46184}"/>
               </a:ext>
             </a:extLst>
           </p:cNvPr>
@@ -3925,7 +3919,7 @@
           <p:cNvPr id="6" name="TextBox 46">
             <a:extLst>
               <a:ext uri="{FF2B5EF4-FFF2-40B4-BE49-F238E27FC236}">
-                <a16:creationId xmlns="" xmlns:a16="http://schemas.microsoft.com/office/drawing/2014/main" id="{C62423BC-5D7F-66F3-7204-29AAC56C5BEA}"/>
+                <a16:creationId xmlns:a16="http://schemas.microsoft.com/office/drawing/2014/main" xmlns="" id="{C62423BC-5D7F-66F3-7204-29AAC56C5BEA}"/>
               </a:ext>
             </a:extLst>
           </p:cNvPr>
@@ -4053,13 +4047,7 @@
               <a:rPr lang="en-US" sz="3200" dirty="0" smtClean="0">
                 <a:cs typeface="Arial" panose="020B0604020202020204" pitchFamily="34" charset="0"/>
               </a:rPr>
-              <a:t>	</a:t>
-            </a:r>
-            <a:r>
-              <a:rPr lang="en-US" sz="3200" dirty="0" smtClean="0">
-                <a:cs typeface="Arial" panose="020B0604020202020204" pitchFamily="34" charset="0"/>
-              </a:rPr>
-              <a:t> The two populations in the study have 	different vowel spaces. Compared to the 	East Asian population the White 	population have fronted back vowels 	and lowered front vowels. </a:t>
+              <a:t>	 The two populations in the study have 	different vowel spaces. Compared to the 	East Asian population the White 	population have fronted back vowels 	and lowered front vowels. </a:t>
             </a:r>
           </a:p>
           <a:p>
@@ -4234,7 +4222,7 @@
           <p:cNvPr id="7" name="Chart 6">
             <a:extLst>
               <a:ext uri="{FF2B5EF4-FFF2-40B4-BE49-F238E27FC236}">
-                <a16:creationId xmlns="" xmlns:a16="http://schemas.microsoft.com/office/drawing/2014/main" id="{3E527EE4-A4C6-3F37-4E31-7023B38E00E0}"/>
+                <a16:creationId xmlns:a16="http://schemas.microsoft.com/office/drawing/2014/main" xmlns="" id="{3E527EE4-A4C6-3F37-4E31-7023B38E00E0}"/>
               </a:ext>
             </a:extLst>
           </p:cNvPr>
@@ -4242,7 +4230,7 @@
           <p:nvPr>
             <p:extLst>
               <p:ext uri="{D42A27DB-BD31-4B8C-83A1-F6EECF244321}">
-                <p14:modId xmlns:p14="http://schemas.microsoft.com/office/powerpoint/2010/main" val="1932947352"/>
+                <p14:modId xmlns:p14="http://schemas.microsoft.com/office/powerpoint/2010/main" val="1304352194"/>
               </p:ext>
             </p:extLst>
           </p:nvPr>
@@ -4262,7 +4250,7 @@
           <p:cNvPr id="8" name="TextBox 7">
             <a:extLst>
               <a:ext uri="{FF2B5EF4-FFF2-40B4-BE49-F238E27FC236}">
-                <a16:creationId xmlns="" xmlns:a16="http://schemas.microsoft.com/office/drawing/2014/main" id="{ED2EF82F-A1E8-28C8-8AA6-F9EA3629FCF8}"/>
+                <a16:creationId xmlns:a16="http://schemas.microsoft.com/office/drawing/2014/main" xmlns="" id="{ED2EF82F-A1E8-28C8-8AA6-F9EA3629FCF8}"/>
               </a:ext>
             </a:extLst>
           </p:cNvPr>
@@ -4272,7 +4260,7 @@
         <p:spPr>
           <a:xfrm>
             <a:off x="21857412" y="14784656"/>
-            <a:ext cx="10862061" cy="7817525"/>
+            <a:ext cx="10862061" cy="3877985"/>
           </a:xfrm>
           <a:prstGeom prst="rect">
             <a:avLst/>
@@ -4306,114 +4294,20 @@
                 </a:solidFill>
                 <a:cs typeface="Arial" panose="020B0604020202020204" pitchFamily="34" charset="0"/>
               </a:rPr>
-              <a:t>SDT </a:t>
-            </a:r>
-            <a:r>
-              <a:rPr lang="en-US" sz="5500" b="1" dirty="0" smtClean="0">
-                <a:solidFill>
-                  <a:srgbClr val="00416E"/>
-                </a:solidFill>
-                <a:cs typeface="Arial" panose="020B0604020202020204" pitchFamily="34" charset="0"/>
-              </a:rPr>
-              <a:t>Results</a:t>
+              <a:t>SDT Results</a:t>
             </a:r>
           </a:p>
           <a:p>
             <a:pPr lvl="0"/>
             <a:r>
-              <a:rPr lang="en-US" sz="3200" b="1" dirty="0"/>
-              <a:t>Front Vowels</a:t>
-            </a:r>
-          </a:p>
-          <a:p>
-            <a:pPr marL="171450" lvl="0" indent="-171450">
-              <a:buFont typeface="Arial" panose="020B0604020202020204" pitchFamily="34" charset="0"/>
-              <a:buChar char="•"/>
-            </a:pPr>
-            <a:r>
-              <a:rPr lang="en-US" sz="3200" dirty="0"/>
-              <a:t>/</a:t>
-            </a:r>
-            <a:r>
-              <a:rPr lang="en-US" sz="3200" dirty="0" err="1"/>
-              <a:t>eɪ</a:t>
-            </a:r>
-            <a:r>
-              <a:rPr lang="en-US" sz="3200" dirty="0"/>
-              <a:t>/ in the White </a:t>
-            </a:r>
-            <a:r>
-              <a:rPr lang="en-US" sz="3200" dirty="0" smtClean="0"/>
-              <a:t>population has a </a:t>
-            </a:r>
-            <a:r>
-              <a:rPr lang="en-US" sz="3200" dirty="0"/>
-              <a:t>low hit rate </a:t>
-            </a:r>
-            <a:r>
-              <a:rPr lang="en-US" sz="3200" dirty="0" smtClean="0"/>
-              <a:t>but high hit rate in EA population</a:t>
-            </a:r>
-            <a:endParaRPr lang="en-US" sz="3200" dirty="0"/>
-          </a:p>
-          <a:p>
-            <a:pPr marL="171450" lvl="0" indent="-171450">
-              <a:buFont typeface="Arial" panose="020B0604020202020204" pitchFamily="34" charset="0"/>
-              <a:buChar char="•"/>
-            </a:pPr>
-            <a:r>
-              <a:rPr lang="en-US" sz="3200" dirty="0"/>
-              <a:t>/ɛ/ high hit rate in both populations</a:t>
-            </a:r>
-          </a:p>
-          <a:p>
-            <a:pPr marL="171450" lvl="0" indent="-171450">
-              <a:buFont typeface="Arial" panose="020B0604020202020204" pitchFamily="34" charset="0"/>
-              <a:buChar char="•"/>
-            </a:pPr>
-            <a:r>
-              <a:rPr lang="en-US" sz="3200" dirty="0"/>
-              <a:t>/ɪ/ </a:t>
-            </a:r>
-            <a:r>
-              <a:rPr lang="en-US" sz="3200" dirty="0" smtClean="0"/>
-              <a:t>near fifty-fifty split </a:t>
-            </a:r>
-            <a:r>
-              <a:rPr lang="en-US" sz="3200" dirty="0"/>
-              <a:t>in both populations</a:t>
-            </a:r>
-          </a:p>
-          <a:p>
-            <a:pPr lvl="0"/>
-            <a:r>
-              <a:rPr lang="en-US" sz="3200" b="1" dirty="0"/>
-              <a:t>Back Vowels</a:t>
-            </a:r>
-          </a:p>
-          <a:p>
-            <a:pPr marL="171450" lvl="0" indent="-171450">
-              <a:buFont typeface="Arial" panose="020B0604020202020204" pitchFamily="34" charset="0"/>
-              <a:buChar char="•"/>
-            </a:pPr>
-            <a:r>
-              <a:rPr lang="en-US" sz="3200" dirty="0"/>
-              <a:t>/ʊ/ fifty-fifty split in the W population high in the EA population</a:t>
-            </a:r>
-          </a:p>
-          <a:p>
-            <a:pPr marL="171450" lvl="0" indent="-171450">
-              <a:buFont typeface="Arial" panose="020B0604020202020204" pitchFamily="34" charset="0"/>
-              <a:buChar char="•"/>
-            </a:pPr>
-            <a:r>
-              <a:rPr lang="en-US" sz="3200" dirty="0"/>
-              <a:t>/u/ high hit rate in both </a:t>
-            </a:r>
-            <a:r>
-              <a:rPr lang="en-US" sz="3200" dirty="0" smtClean="0"/>
-              <a:t>populations</a:t>
-            </a:r>
+              <a:rPr lang="en-US" sz="3200" b="1" dirty="0" smtClean="0"/>
+              <a:t>Insert some summary of </a:t>
+            </a:r>
+            <a:r>
+              <a:rPr lang="en-US" sz="3200" b="1" smtClean="0"/>
+              <a:t>the results idk. </a:t>
+            </a:r>
+            <a:endParaRPr lang="en-US" sz="3200" dirty="0" smtClean="0"/>
           </a:p>
           <a:p>
             <a:pPr lvl="0"/>
@@ -4457,7 +4351,7 @@
           <p:cNvPr id="11" name="TextBox 46">
             <a:extLst>
               <a:ext uri="{FF2B5EF4-FFF2-40B4-BE49-F238E27FC236}">
-                <a16:creationId xmlns="" xmlns:a16="http://schemas.microsoft.com/office/drawing/2014/main" id="{C9301CB2-12EF-3F30-F407-28E857D79E5E}"/>
+                <a16:creationId xmlns:a16="http://schemas.microsoft.com/office/drawing/2014/main" xmlns="" id="{C9301CB2-12EF-3F30-F407-28E857D79E5E}"/>
               </a:ext>
             </a:extLst>
           </p:cNvPr>

</xml_diff>